<commit_message>
efa and day 2 slides.
</commit_message>
<xml_diff>
--- a/docs/Day 2 Slides.pptx
+++ b/docs/Day 2 Slides.pptx
@@ -5,7 +5,7 @@
     <p:sldMasterId id="2147483672" r:id="rId1"/>
   </p:sldMasterIdLst>
   <p:notesMasterIdLst>
-    <p:notesMasterId r:id="rId19"/>
+    <p:notesMasterId r:id="rId27"/>
   </p:notesMasterIdLst>
   <p:sldIdLst>
     <p:sldId id="256" r:id="rId2"/>
@@ -17,14 +17,22 @@
     <p:sldId id="382" r:id="rId8"/>
     <p:sldId id="389" r:id="rId9"/>
     <p:sldId id="383" r:id="rId10"/>
-    <p:sldId id="390" r:id="rId11"/>
-    <p:sldId id="391" r:id="rId12"/>
-    <p:sldId id="392" r:id="rId13"/>
-    <p:sldId id="393" r:id="rId14"/>
-    <p:sldId id="394" r:id="rId15"/>
-    <p:sldId id="395" r:id="rId16"/>
-    <p:sldId id="384" r:id="rId17"/>
-    <p:sldId id="396" r:id="rId18"/>
+    <p:sldId id="397" r:id="rId11"/>
+    <p:sldId id="399" r:id="rId12"/>
+    <p:sldId id="402" r:id="rId13"/>
+    <p:sldId id="401" r:id="rId14"/>
+    <p:sldId id="403" r:id="rId15"/>
+    <p:sldId id="400" r:id="rId16"/>
+    <p:sldId id="398" r:id="rId17"/>
+    <p:sldId id="404" r:id="rId18"/>
+    <p:sldId id="390" r:id="rId19"/>
+    <p:sldId id="391" r:id="rId20"/>
+    <p:sldId id="392" r:id="rId21"/>
+    <p:sldId id="393" r:id="rId22"/>
+    <p:sldId id="394" r:id="rId23"/>
+    <p:sldId id="395" r:id="rId24"/>
+    <p:sldId id="384" r:id="rId25"/>
+    <p:sldId id="396" r:id="rId26"/>
   </p:sldIdLst>
   <p:sldSz cx="12192000" cy="6858000"/>
   <p:notesSz cx="6858000" cy="9144000"/>
@@ -4172,6 +4180,1502 @@
           <a:p>
             <a:r>
               <a:rPr lang="en-US" dirty="0" smtClean="0"/>
+              <a:t>Exploratory Factor Analysis (EFA)</a:t>
+            </a:r>
+            <a:endParaRPr lang="en-US" dirty="0"/>
+          </a:p>
+        </p:txBody>
+      </p:sp>
+      <p:sp>
+        <p:nvSpPr>
+          <p:cNvPr id="3" name="Content Placeholder 2"/>
+          <p:cNvSpPr>
+            <a:spLocks noGrp="1"/>
+          </p:cNvSpPr>
+          <p:nvPr>
+            <p:ph idx="1"/>
+          </p:nvPr>
+        </p:nvSpPr>
+        <p:spPr/>
+        <p:txBody>
+          <a:bodyPr>
+            <a:normAutofit/>
+          </a:bodyPr>
+          <a:lstStyle/>
+          <a:p>
+            <a:r>
+              <a:rPr lang="en-US" dirty="0" smtClean="0"/>
+              <a:t>Exploratory Factor Analysis (EFA) will use inter-correlations among the items to give us a sense of</a:t>
+            </a:r>
+            <a:r>
+              <a:rPr lang="mr-IN" dirty="0" smtClean="0"/>
+              <a:t>…</a:t>
+            </a:r>
+            <a:endParaRPr lang="en-US" dirty="0" smtClean="0"/>
+          </a:p>
+          <a:p>
+            <a:pPr marL="731520" lvl="1" indent="-457200">
+              <a:buFont typeface="+mj-lt"/>
+              <a:buAutoNum type="arabicPeriod"/>
+            </a:pPr>
+            <a:r>
+              <a:rPr lang="en-US" dirty="0" smtClean="0"/>
+              <a:t>how </a:t>
+            </a:r>
+            <a:r>
+              <a:rPr lang="en-US" dirty="0"/>
+              <a:t>many </a:t>
+            </a:r>
+            <a:r>
+              <a:rPr lang="en-US" dirty="0" smtClean="0"/>
+              <a:t>factors may be present, </a:t>
+            </a:r>
+            <a:endParaRPr lang="en-US" dirty="0"/>
+          </a:p>
+          <a:p>
+            <a:pPr marL="731520" lvl="1" indent="-457200">
+              <a:buFont typeface="+mj-lt"/>
+              <a:buAutoNum type="arabicPeriod"/>
+            </a:pPr>
+            <a:r>
+              <a:rPr lang="en-US" dirty="0" smtClean="0"/>
+              <a:t>which </a:t>
+            </a:r>
+            <a:r>
+              <a:rPr lang="en-US" dirty="0"/>
+              <a:t>items can be explained by which </a:t>
+            </a:r>
+            <a:r>
+              <a:rPr lang="en-US" dirty="0" smtClean="0"/>
+              <a:t>factors, and</a:t>
+            </a:r>
+          </a:p>
+          <a:p>
+            <a:pPr marL="731520" lvl="1" indent="-457200">
+              <a:buFont typeface="+mj-lt"/>
+              <a:buAutoNum type="arabicPeriod"/>
+            </a:pPr>
+            <a:r>
+              <a:rPr lang="en-US" dirty="0" smtClean="0"/>
+              <a:t>the extent to which these underlying factors are correlated with each other.</a:t>
+            </a:r>
+          </a:p>
+          <a:p>
+            <a:endParaRPr lang="en-US" dirty="0"/>
+          </a:p>
+          <a:p>
+            <a:r>
+              <a:rPr lang="en-US" dirty="0" smtClean="0"/>
+              <a:t>EFA is just that, exploratory. </a:t>
+            </a:r>
+            <a:endParaRPr lang="en-US" dirty="0"/>
+          </a:p>
+          <a:p>
+            <a:pPr lvl="1"/>
+            <a:r>
+              <a:rPr lang="en-US" dirty="0" smtClean="0"/>
+              <a:t>It is important to keep in mind that in the end this is a data driven technique. Meaning that peculiarities in the data may lead you to a rather weird solution.</a:t>
+            </a:r>
+          </a:p>
+          <a:p>
+            <a:pPr lvl="1"/>
+            <a:r>
+              <a:rPr lang="en-US" dirty="0" smtClean="0"/>
+              <a:t>It takes some sense finesse, listen to what your data is telling you</a:t>
+            </a:r>
+            <a:r>
+              <a:rPr lang="en-US" dirty="0"/>
+              <a:t>.</a:t>
+            </a:r>
+            <a:endParaRPr lang="en-US" dirty="0"/>
+          </a:p>
+        </p:txBody>
+      </p:sp>
+    </p:spTree>
+    <p:extLst>
+      <p:ext uri="{BB962C8B-B14F-4D97-AF65-F5344CB8AC3E}">
+        <p14:creationId xmlns:p14="http://schemas.microsoft.com/office/powerpoint/2010/main" val="736077395"/>
+      </p:ext>
+    </p:extLst>
+  </p:cSld>
+  <p:clrMapOvr>
+    <a:masterClrMapping/>
+  </p:clrMapOvr>
+</p:sld>
+</file>
+
+<file path=ppt/slides/slide11.xml><?xml version="1.0" encoding="utf-8"?>
+<p:sld xmlns:a="http://schemas.openxmlformats.org/drawingml/2006/main" xmlns:r="http://schemas.openxmlformats.org/officeDocument/2006/relationships" xmlns:p="http://schemas.openxmlformats.org/presentationml/2006/main">
+  <p:cSld>
+    <p:spTree>
+      <p:nvGrpSpPr>
+        <p:cNvPr id="1" name=""/>
+        <p:cNvGrpSpPr/>
+        <p:nvPr/>
+      </p:nvGrpSpPr>
+      <p:grpSpPr>
+        <a:xfrm>
+          <a:off x="0" y="0"/>
+          <a:ext cx="0" cy="0"/>
+          <a:chOff x="0" y="0"/>
+          <a:chExt cx="0" cy="0"/>
+        </a:xfrm>
+      </p:grpSpPr>
+      <p:sp>
+        <p:nvSpPr>
+          <p:cNvPr id="2" name="Title 1"/>
+          <p:cNvSpPr>
+            <a:spLocks noGrp="1"/>
+          </p:cNvSpPr>
+          <p:nvPr>
+            <p:ph type="title"/>
+          </p:nvPr>
+        </p:nvSpPr>
+        <p:spPr/>
+        <p:txBody>
+          <a:bodyPr/>
+          <a:lstStyle/>
+          <a:p>
+            <a:r>
+              <a:rPr lang="en-US" dirty="0" smtClean="0"/>
+              <a:t>Factor Rotation</a:t>
+            </a:r>
+            <a:endParaRPr lang="en-US" dirty="0"/>
+          </a:p>
+        </p:txBody>
+      </p:sp>
+      <p:sp>
+        <p:nvSpPr>
+          <p:cNvPr id="3" name="Content Placeholder 2"/>
+          <p:cNvSpPr>
+            <a:spLocks noGrp="1"/>
+          </p:cNvSpPr>
+          <p:nvPr>
+            <p:ph idx="1"/>
+          </p:nvPr>
+        </p:nvSpPr>
+        <p:spPr/>
+        <p:txBody>
+          <a:bodyPr>
+            <a:normAutofit/>
+          </a:bodyPr>
+          <a:lstStyle/>
+          <a:p>
+            <a:r>
+              <a:rPr lang="en-US" dirty="0" err="1" smtClean="0"/>
+              <a:t>Unrotated</a:t>
+            </a:r>
+            <a:r>
+              <a:rPr lang="en-US" dirty="0" smtClean="0"/>
+              <a:t> </a:t>
+            </a:r>
+            <a:r>
+              <a:rPr lang="en-US" dirty="0" smtClean="0"/>
+              <a:t>solution</a:t>
+            </a:r>
+            <a:endParaRPr lang="en-US" dirty="0" smtClean="0"/>
+          </a:p>
+        </p:txBody>
+      </p:sp>
+      <p:pic>
+        <p:nvPicPr>
+          <p:cNvPr id="6" name="Picture 5"/>
+          <p:cNvPicPr>
+            <a:picLocks noChangeAspect="1"/>
+          </p:cNvPicPr>
+          <p:nvPr/>
+        </p:nvPicPr>
+        <p:blipFill>
+          <a:blip r:embed="rId2">
+            <a:extLst>
+              <a:ext uri="{28A0092B-C50C-407E-A947-70E740481C1C}">
+                <a14:useLocalDpi xmlns:a14="http://schemas.microsoft.com/office/drawing/2010/main" val="0"/>
+              </a:ext>
+            </a:extLst>
+          </a:blip>
+          <a:stretch>
+            <a:fillRect/>
+          </a:stretch>
+        </p:blipFill>
+        <p:spPr>
+          <a:xfrm>
+            <a:off x="4450369" y="1549668"/>
+            <a:ext cx="6374607" cy="4820251"/>
+          </a:xfrm>
+          <a:prstGeom prst="rect">
+            <a:avLst/>
+          </a:prstGeom>
+        </p:spPr>
+      </p:pic>
+      <p:pic>
+        <p:nvPicPr>
+          <p:cNvPr id="7" name="Picture 6"/>
+          <p:cNvPicPr>
+            <a:picLocks noChangeAspect="1"/>
+          </p:cNvPicPr>
+          <p:nvPr/>
+        </p:nvPicPr>
+        <p:blipFill>
+          <a:blip r:embed="rId3">
+            <a:extLst>
+              <a:ext uri="{28A0092B-C50C-407E-A947-70E740481C1C}">
+                <a14:useLocalDpi xmlns:a14="http://schemas.microsoft.com/office/drawing/2010/main" val="0"/>
+              </a:ext>
+            </a:extLst>
+          </a:blip>
+          <a:stretch>
+            <a:fillRect/>
+          </a:stretch>
+        </p:blipFill>
+        <p:spPr>
+          <a:xfrm>
+            <a:off x="1842703" y="2870200"/>
+            <a:ext cx="1422400" cy="2413000"/>
+          </a:xfrm>
+          <a:prstGeom prst="rect">
+            <a:avLst/>
+          </a:prstGeom>
+        </p:spPr>
+      </p:pic>
+    </p:spTree>
+    <p:extLst>
+      <p:ext uri="{BB962C8B-B14F-4D97-AF65-F5344CB8AC3E}">
+        <p14:creationId xmlns:p14="http://schemas.microsoft.com/office/powerpoint/2010/main" val="1317259407"/>
+      </p:ext>
+    </p:extLst>
+  </p:cSld>
+  <p:clrMapOvr>
+    <a:masterClrMapping/>
+  </p:clrMapOvr>
+</p:sld>
+</file>
+
+<file path=ppt/slides/slide12.xml><?xml version="1.0" encoding="utf-8"?>
+<p:sld xmlns:a="http://schemas.openxmlformats.org/drawingml/2006/main" xmlns:r="http://schemas.openxmlformats.org/officeDocument/2006/relationships" xmlns:p="http://schemas.openxmlformats.org/presentationml/2006/main">
+  <p:cSld>
+    <p:spTree>
+      <p:nvGrpSpPr>
+        <p:cNvPr id="1" name=""/>
+        <p:cNvGrpSpPr/>
+        <p:nvPr/>
+      </p:nvGrpSpPr>
+      <p:grpSpPr>
+        <a:xfrm>
+          <a:off x="0" y="0"/>
+          <a:ext cx="0" cy="0"/>
+          <a:chOff x="0" y="0"/>
+          <a:chExt cx="0" cy="0"/>
+        </a:xfrm>
+      </p:grpSpPr>
+      <p:sp>
+        <p:nvSpPr>
+          <p:cNvPr id="2" name="Title 1"/>
+          <p:cNvSpPr>
+            <a:spLocks noGrp="1"/>
+          </p:cNvSpPr>
+          <p:nvPr>
+            <p:ph type="title"/>
+          </p:nvPr>
+        </p:nvSpPr>
+        <p:spPr/>
+        <p:txBody>
+          <a:bodyPr/>
+          <a:lstStyle/>
+          <a:p>
+            <a:r>
+              <a:rPr lang="en-US" dirty="0" smtClean="0"/>
+              <a:t>Factor Rotation</a:t>
+            </a:r>
+            <a:endParaRPr lang="en-US" dirty="0"/>
+          </a:p>
+        </p:txBody>
+      </p:sp>
+      <p:sp>
+        <p:nvSpPr>
+          <p:cNvPr id="3" name="Content Placeholder 2"/>
+          <p:cNvSpPr>
+            <a:spLocks noGrp="1"/>
+          </p:cNvSpPr>
+          <p:nvPr>
+            <p:ph idx="1"/>
+          </p:nvPr>
+        </p:nvSpPr>
+        <p:spPr/>
+        <p:txBody>
+          <a:bodyPr>
+            <a:normAutofit/>
+          </a:bodyPr>
+          <a:lstStyle/>
+          <a:p>
+            <a:r>
+              <a:rPr lang="en-US" dirty="0" err="1" smtClean="0"/>
+              <a:t>Unrotated</a:t>
+            </a:r>
+            <a:r>
+              <a:rPr lang="en-US" dirty="0" smtClean="0"/>
+              <a:t> </a:t>
+            </a:r>
+            <a:r>
+              <a:rPr lang="en-US" dirty="0" smtClean="0"/>
+              <a:t>solution</a:t>
+            </a:r>
+            <a:endParaRPr lang="en-US" dirty="0" smtClean="0"/>
+          </a:p>
+        </p:txBody>
+      </p:sp>
+      <p:pic>
+        <p:nvPicPr>
+          <p:cNvPr id="6" name="Picture 5"/>
+          <p:cNvPicPr>
+            <a:picLocks noChangeAspect="1"/>
+          </p:cNvPicPr>
+          <p:nvPr/>
+        </p:nvPicPr>
+        <p:blipFill>
+          <a:blip r:embed="rId2">
+            <a:extLst>
+              <a:ext uri="{28A0092B-C50C-407E-A947-70E740481C1C}">
+                <a14:useLocalDpi xmlns:a14="http://schemas.microsoft.com/office/drawing/2010/main" val="0"/>
+              </a:ext>
+            </a:extLst>
+          </a:blip>
+          <a:stretch>
+            <a:fillRect/>
+          </a:stretch>
+        </p:blipFill>
+        <p:spPr>
+          <a:xfrm>
+            <a:off x="4450369" y="1549668"/>
+            <a:ext cx="6374607" cy="4820251"/>
+          </a:xfrm>
+          <a:prstGeom prst="rect">
+            <a:avLst/>
+          </a:prstGeom>
+        </p:spPr>
+      </p:pic>
+      <p:pic>
+        <p:nvPicPr>
+          <p:cNvPr id="7" name="Picture 6"/>
+          <p:cNvPicPr>
+            <a:picLocks noChangeAspect="1"/>
+          </p:cNvPicPr>
+          <p:nvPr/>
+        </p:nvPicPr>
+        <p:blipFill>
+          <a:blip r:embed="rId3">
+            <a:extLst>
+              <a:ext uri="{28A0092B-C50C-407E-A947-70E740481C1C}">
+                <a14:useLocalDpi xmlns:a14="http://schemas.microsoft.com/office/drawing/2010/main" val="0"/>
+              </a:ext>
+            </a:extLst>
+          </a:blip>
+          <a:stretch>
+            <a:fillRect/>
+          </a:stretch>
+        </p:blipFill>
+        <p:spPr>
+          <a:xfrm>
+            <a:off x="1842703" y="2870200"/>
+            <a:ext cx="1422400" cy="2413000"/>
+          </a:xfrm>
+          <a:prstGeom prst="rect">
+            <a:avLst/>
+          </a:prstGeom>
+        </p:spPr>
+      </p:pic>
+      <p:cxnSp>
+        <p:nvCxnSpPr>
+          <p:cNvPr id="9" name="Straight Connector 8"/>
+          <p:cNvCxnSpPr/>
+          <p:nvPr/>
+        </p:nvCxnSpPr>
+        <p:spPr>
+          <a:xfrm flipV="1">
+            <a:off x="4687503" y="1636295"/>
+            <a:ext cx="6035040" cy="4733624"/>
+          </a:xfrm>
+          <a:prstGeom prst="line">
+            <a:avLst/>
+          </a:prstGeom>
+          <a:ln w="38100">
+            <a:solidFill>
+              <a:schemeClr val="accent2"/>
+            </a:solidFill>
+            <a:prstDash val="dash"/>
+          </a:ln>
+        </p:spPr>
+        <p:style>
+          <a:lnRef idx="1">
+            <a:schemeClr val="accent1"/>
+          </a:lnRef>
+          <a:fillRef idx="0">
+            <a:schemeClr val="accent1"/>
+          </a:fillRef>
+          <a:effectRef idx="0">
+            <a:schemeClr val="accent1"/>
+          </a:effectRef>
+          <a:fontRef idx="minor">
+            <a:schemeClr val="tx1"/>
+          </a:fontRef>
+        </p:style>
+      </p:cxnSp>
+      <p:cxnSp>
+        <p:nvCxnSpPr>
+          <p:cNvPr id="12" name="Straight Connector 11"/>
+          <p:cNvCxnSpPr/>
+          <p:nvPr/>
+        </p:nvCxnSpPr>
+        <p:spPr>
+          <a:xfrm>
+            <a:off x="5194197" y="1520793"/>
+            <a:ext cx="5091764" cy="4758088"/>
+          </a:xfrm>
+          <a:prstGeom prst="line">
+            <a:avLst/>
+          </a:prstGeom>
+          <a:ln w="38100">
+            <a:solidFill>
+              <a:schemeClr val="accent2"/>
+            </a:solidFill>
+            <a:prstDash val="dash"/>
+          </a:ln>
+        </p:spPr>
+        <p:style>
+          <a:lnRef idx="1">
+            <a:schemeClr val="accent1"/>
+          </a:lnRef>
+          <a:fillRef idx="0">
+            <a:schemeClr val="accent1"/>
+          </a:fillRef>
+          <a:effectRef idx="0">
+            <a:schemeClr val="accent1"/>
+          </a:effectRef>
+          <a:fontRef idx="minor">
+            <a:schemeClr val="tx1"/>
+          </a:fontRef>
+        </p:style>
+      </p:cxnSp>
+    </p:spTree>
+    <p:extLst>
+      <p:ext uri="{BB962C8B-B14F-4D97-AF65-F5344CB8AC3E}">
+        <p14:creationId xmlns:p14="http://schemas.microsoft.com/office/powerpoint/2010/main" val="122126511"/>
+      </p:ext>
+    </p:extLst>
+  </p:cSld>
+  <p:clrMapOvr>
+    <a:masterClrMapping/>
+  </p:clrMapOvr>
+</p:sld>
+</file>
+
+<file path=ppt/slides/slide13.xml><?xml version="1.0" encoding="utf-8"?>
+<p:sld xmlns:a="http://schemas.openxmlformats.org/drawingml/2006/main" xmlns:r="http://schemas.openxmlformats.org/officeDocument/2006/relationships" xmlns:p="http://schemas.openxmlformats.org/presentationml/2006/main">
+  <p:cSld>
+    <p:spTree>
+      <p:nvGrpSpPr>
+        <p:cNvPr id="1" name=""/>
+        <p:cNvGrpSpPr/>
+        <p:nvPr/>
+      </p:nvGrpSpPr>
+      <p:grpSpPr>
+        <a:xfrm>
+          <a:off x="0" y="0"/>
+          <a:ext cx="0" cy="0"/>
+          <a:chOff x="0" y="0"/>
+          <a:chExt cx="0" cy="0"/>
+        </a:xfrm>
+      </p:grpSpPr>
+      <p:sp>
+        <p:nvSpPr>
+          <p:cNvPr id="2" name="Title 1"/>
+          <p:cNvSpPr>
+            <a:spLocks noGrp="1"/>
+          </p:cNvSpPr>
+          <p:nvPr>
+            <p:ph type="title"/>
+          </p:nvPr>
+        </p:nvSpPr>
+        <p:spPr/>
+        <p:txBody>
+          <a:bodyPr/>
+          <a:lstStyle/>
+          <a:p>
+            <a:r>
+              <a:rPr lang="en-US" dirty="0" smtClean="0"/>
+              <a:t>Factor Rotation</a:t>
+            </a:r>
+            <a:endParaRPr lang="en-US" dirty="0"/>
+          </a:p>
+        </p:txBody>
+      </p:sp>
+      <p:sp>
+        <p:nvSpPr>
+          <p:cNvPr id="3" name="Content Placeholder 2"/>
+          <p:cNvSpPr>
+            <a:spLocks noGrp="1"/>
+          </p:cNvSpPr>
+          <p:nvPr>
+            <p:ph idx="1"/>
+          </p:nvPr>
+        </p:nvSpPr>
+        <p:spPr/>
+        <p:txBody>
+          <a:bodyPr>
+            <a:normAutofit/>
+          </a:bodyPr>
+          <a:lstStyle/>
+          <a:p>
+            <a:r>
+              <a:rPr lang="en-US" dirty="0" smtClean="0"/>
+              <a:t>Orthogonal rotation</a:t>
+            </a:r>
+          </a:p>
+        </p:txBody>
+      </p:sp>
+      <p:pic>
+        <p:nvPicPr>
+          <p:cNvPr id="4" name="Picture 3"/>
+          <p:cNvPicPr>
+            <a:picLocks noChangeAspect="1"/>
+          </p:cNvPicPr>
+          <p:nvPr/>
+        </p:nvPicPr>
+        <p:blipFill>
+          <a:blip r:embed="rId2">
+            <a:extLst>
+              <a:ext uri="{28A0092B-C50C-407E-A947-70E740481C1C}">
+                <a14:useLocalDpi xmlns:a14="http://schemas.microsoft.com/office/drawing/2010/main" val="0"/>
+              </a:ext>
+            </a:extLst>
+          </a:blip>
+          <a:stretch>
+            <a:fillRect/>
+          </a:stretch>
+        </p:blipFill>
+        <p:spPr>
+          <a:xfrm>
+            <a:off x="1907005" y="2944395"/>
+            <a:ext cx="1435100" cy="2413000"/>
+          </a:xfrm>
+          <a:prstGeom prst="rect">
+            <a:avLst/>
+          </a:prstGeom>
+        </p:spPr>
+      </p:pic>
+      <p:pic>
+        <p:nvPicPr>
+          <p:cNvPr id="5" name="Picture 4"/>
+          <p:cNvPicPr>
+            <a:picLocks noChangeAspect="1"/>
+          </p:cNvPicPr>
+          <p:nvPr/>
+        </p:nvPicPr>
+        <p:blipFill>
+          <a:blip r:embed="rId3">
+            <a:extLst>
+              <a:ext uri="{28A0092B-C50C-407E-A947-70E740481C1C}">
+                <a14:useLocalDpi xmlns:a14="http://schemas.microsoft.com/office/drawing/2010/main" val="0"/>
+              </a:ext>
+            </a:extLst>
+          </a:blip>
+          <a:stretch>
+            <a:fillRect/>
+          </a:stretch>
+        </p:blipFill>
+        <p:spPr>
+          <a:xfrm>
+            <a:off x="4554889" y="1732548"/>
+            <a:ext cx="6134229" cy="4634563"/>
+          </a:xfrm>
+          <a:prstGeom prst="rect">
+            <a:avLst/>
+          </a:prstGeom>
+        </p:spPr>
+      </p:pic>
+    </p:spTree>
+    <p:extLst>
+      <p:ext uri="{BB962C8B-B14F-4D97-AF65-F5344CB8AC3E}">
+        <p14:creationId xmlns:p14="http://schemas.microsoft.com/office/powerpoint/2010/main" val="357959980"/>
+      </p:ext>
+    </p:extLst>
+  </p:cSld>
+  <p:clrMapOvr>
+    <a:masterClrMapping/>
+  </p:clrMapOvr>
+</p:sld>
+</file>
+
+<file path=ppt/slides/slide14.xml><?xml version="1.0" encoding="utf-8"?>
+<p:sld xmlns:a="http://schemas.openxmlformats.org/drawingml/2006/main" xmlns:r="http://schemas.openxmlformats.org/officeDocument/2006/relationships" xmlns:p="http://schemas.openxmlformats.org/presentationml/2006/main">
+  <p:cSld>
+    <p:spTree>
+      <p:nvGrpSpPr>
+        <p:cNvPr id="1" name=""/>
+        <p:cNvGrpSpPr/>
+        <p:nvPr/>
+      </p:nvGrpSpPr>
+      <p:grpSpPr>
+        <a:xfrm>
+          <a:off x="0" y="0"/>
+          <a:ext cx="0" cy="0"/>
+          <a:chOff x="0" y="0"/>
+          <a:chExt cx="0" cy="0"/>
+        </a:xfrm>
+      </p:grpSpPr>
+      <p:sp>
+        <p:nvSpPr>
+          <p:cNvPr id="2" name="Title 1"/>
+          <p:cNvSpPr>
+            <a:spLocks noGrp="1"/>
+          </p:cNvSpPr>
+          <p:nvPr>
+            <p:ph type="title"/>
+          </p:nvPr>
+        </p:nvSpPr>
+        <p:spPr/>
+        <p:txBody>
+          <a:bodyPr/>
+          <a:lstStyle/>
+          <a:p>
+            <a:r>
+              <a:rPr lang="en-US" dirty="0" smtClean="0"/>
+              <a:t>Factor Rotation</a:t>
+            </a:r>
+            <a:endParaRPr lang="en-US" dirty="0"/>
+          </a:p>
+        </p:txBody>
+      </p:sp>
+      <p:sp>
+        <p:nvSpPr>
+          <p:cNvPr id="3" name="Content Placeholder 2"/>
+          <p:cNvSpPr>
+            <a:spLocks noGrp="1"/>
+          </p:cNvSpPr>
+          <p:nvPr>
+            <p:ph idx="1"/>
+          </p:nvPr>
+        </p:nvSpPr>
+        <p:spPr/>
+        <p:txBody>
+          <a:bodyPr>
+            <a:normAutofit/>
+          </a:bodyPr>
+          <a:lstStyle/>
+          <a:p>
+            <a:r>
+              <a:rPr lang="en-US" dirty="0" smtClean="0"/>
+              <a:t>Orthogonal rotation</a:t>
+            </a:r>
+          </a:p>
+        </p:txBody>
+      </p:sp>
+      <p:pic>
+        <p:nvPicPr>
+          <p:cNvPr id="4" name="Picture 3"/>
+          <p:cNvPicPr>
+            <a:picLocks noChangeAspect="1"/>
+          </p:cNvPicPr>
+          <p:nvPr/>
+        </p:nvPicPr>
+        <p:blipFill>
+          <a:blip r:embed="rId2">
+            <a:extLst>
+              <a:ext uri="{28A0092B-C50C-407E-A947-70E740481C1C}">
+                <a14:useLocalDpi xmlns:a14="http://schemas.microsoft.com/office/drawing/2010/main" val="0"/>
+              </a:ext>
+            </a:extLst>
+          </a:blip>
+          <a:stretch>
+            <a:fillRect/>
+          </a:stretch>
+        </p:blipFill>
+        <p:spPr>
+          <a:xfrm>
+            <a:off x="1907005" y="2944395"/>
+            <a:ext cx="1435100" cy="2413000"/>
+          </a:xfrm>
+          <a:prstGeom prst="rect">
+            <a:avLst/>
+          </a:prstGeom>
+        </p:spPr>
+      </p:pic>
+      <p:pic>
+        <p:nvPicPr>
+          <p:cNvPr id="5" name="Picture 4"/>
+          <p:cNvPicPr>
+            <a:picLocks noChangeAspect="1"/>
+          </p:cNvPicPr>
+          <p:nvPr/>
+        </p:nvPicPr>
+        <p:blipFill>
+          <a:blip r:embed="rId3">
+            <a:extLst>
+              <a:ext uri="{28A0092B-C50C-407E-A947-70E740481C1C}">
+                <a14:useLocalDpi xmlns:a14="http://schemas.microsoft.com/office/drawing/2010/main" val="0"/>
+              </a:ext>
+            </a:extLst>
+          </a:blip>
+          <a:stretch>
+            <a:fillRect/>
+          </a:stretch>
+        </p:blipFill>
+        <p:spPr>
+          <a:xfrm>
+            <a:off x="4554889" y="1732548"/>
+            <a:ext cx="6134229" cy="4634563"/>
+          </a:xfrm>
+          <a:prstGeom prst="rect">
+            <a:avLst/>
+          </a:prstGeom>
+        </p:spPr>
+      </p:pic>
+      <p:cxnSp>
+        <p:nvCxnSpPr>
+          <p:cNvPr id="8" name="Straight Connector 7"/>
+          <p:cNvCxnSpPr/>
+          <p:nvPr/>
+        </p:nvCxnSpPr>
+        <p:spPr>
+          <a:xfrm flipV="1">
+            <a:off x="4244741" y="3850104"/>
+            <a:ext cx="6872444" cy="1135782"/>
+          </a:xfrm>
+          <a:prstGeom prst="line">
+            <a:avLst/>
+          </a:prstGeom>
+          <a:ln w="38100">
+            <a:solidFill>
+              <a:schemeClr val="accent2"/>
+            </a:solidFill>
+            <a:prstDash val="dash"/>
+          </a:ln>
+        </p:spPr>
+        <p:style>
+          <a:lnRef idx="1">
+            <a:schemeClr val="accent1"/>
+          </a:lnRef>
+          <a:fillRef idx="0">
+            <a:schemeClr val="accent1"/>
+          </a:fillRef>
+          <a:effectRef idx="0">
+            <a:schemeClr val="accent1"/>
+          </a:effectRef>
+          <a:fontRef idx="minor">
+            <a:schemeClr val="tx1"/>
+          </a:fontRef>
+        </p:style>
+      </p:cxnSp>
+      <p:cxnSp>
+        <p:nvCxnSpPr>
+          <p:cNvPr id="9" name="Straight Connector 8"/>
+          <p:cNvCxnSpPr/>
+          <p:nvPr/>
+        </p:nvCxnSpPr>
+        <p:spPr>
+          <a:xfrm flipH="1">
+            <a:off x="7526959" y="1357162"/>
+            <a:ext cx="895148" cy="5168766"/>
+          </a:xfrm>
+          <a:prstGeom prst="line">
+            <a:avLst/>
+          </a:prstGeom>
+          <a:ln w="38100">
+            <a:solidFill>
+              <a:schemeClr val="accent2"/>
+            </a:solidFill>
+            <a:prstDash val="dash"/>
+          </a:ln>
+        </p:spPr>
+        <p:style>
+          <a:lnRef idx="1">
+            <a:schemeClr val="accent1"/>
+          </a:lnRef>
+          <a:fillRef idx="0">
+            <a:schemeClr val="accent1"/>
+          </a:fillRef>
+          <a:effectRef idx="0">
+            <a:schemeClr val="accent1"/>
+          </a:effectRef>
+          <a:fontRef idx="minor">
+            <a:schemeClr val="tx1"/>
+          </a:fontRef>
+        </p:style>
+      </p:cxnSp>
+    </p:spTree>
+    <p:extLst>
+      <p:ext uri="{BB962C8B-B14F-4D97-AF65-F5344CB8AC3E}">
+        <p14:creationId xmlns:p14="http://schemas.microsoft.com/office/powerpoint/2010/main" val="321692198"/>
+      </p:ext>
+    </p:extLst>
+  </p:cSld>
+  <p:clrMapOvr>
+    <a:masterClrMapping/>
+  </p:clrMapOvr>
+</p:sld>
+</file>
+
+<file path=ppt/slides/slide15.xml><?xml version="1.0" encoding="utf-8"?>
+<p:sld xmlns:a="http://schemas.openxmlformats.org/drawingml/2006/main" xmlns:r="http://schemas.openxmlformats.org/officeDocument/2006/relationships" xmlns:p="http://schemas.openxmlformats.org/presentationml/2006/main">
+  <p:cSld>
+    <p:spTree>
+      <p:nvGrpSpPr>
+        <p:cNvPr id="1" name=""/>
+        <p:cNvGrpSpPr/>
+        <p:nvPr/>
+      </p:nvGrpSpPr>
+      <p:grpSpPr>
+        <a:xfrm>
+          <a:off x="0" y="0"/>
+          <a:ext cx="0" cy="0"/>
+          <a:chOff x="0" y="0"/>
+          <a:chExt cx="0" cy="0"/>
+        </a:xfrm>
+      </p:grpSpPr>
+      <p:sp>
+        <p:nvSpPr>
+          <p:cNvPr id="2" name="Title 1"/>
+          <p:cNvSpPr>
+            <a:spLocks noGrp="1"/>
+          </p:cNvSpPr>
+          <p:nvPr>
+            <p:ph type="title"/>
+          </p:nvPr>
+        </p:nvSpPr>
+        <p:spPr/>
+        <p:txBody>
+          <a:bodyPr/>
+          <a:lstStyle/>
+          <a:p>
+            <a:r>
+              <a:rPr lang="en-US" dirty="0" smtClean="0"/>
+              <a:t>Exploratory Factor Analysis (EFA)</a:t>
+            </a:r>
+            <a:endParaRPr lang="en-US" dirty="0"/>
+          </a:p>
+        </p:txBody>
+      </p:sp>
+      <p:sp>
+        <p:nvSpPr>
+          <p:cNvPr id="3" name="Content Placeholder 2"/>
+          <p:cNvSpPr>
+            <a:spLocks noGrp="1"/>
+          </p:cNvSpPr>
+          <p:nvPr>
+            <p:ph idx="1"/>
+          </p:nvPr>
+        </p:nvSpPr>
+        <p:spPr/>
+        <p:txBody>
+          <a:bodyPr>
+            <a:normAutofit/>
+          </a:bodyPr>
+          <a:lstStyle/>
+          <a:p>
+            <a:r>
+              <a:rPr lang="en-US" dirty="0" smtClean="0"/>
+              <a:t>Oblique factor rotation</a:t>
+            </a:r>
+            <a:endParaRPr lang="en-US" dirty="0"/>
+          </a:p>
+        </p:txBody>
+      </p:sp>
+      <p:pic>
+        <p:nvPicPr>
+          <p:cNvPr id="5" name="Picture 4"/>
+          <p:cNvPicPr>
+            <a:picLocks noChangeAspect="1"/>
+          </p:cNvPicPr>
+          <p:nvPr/>
+        </p:nvPicPr>
+        <p:blipFill>
+          <a:blip r:embed="rId2">
+            <a:extLst>
+              <a:ext uri="{28A0092B-C50C-407E-A947-70E740481C1C}">
+                <a14:useLocalDpi xmlns:a14="http://schemas.microsoft.com/office/drawing/2010/main" val="0"/>
+              </a:ext>
+            </a:extLst>
+          </a:blip>
+          <a:stretch>
+            <a:fillRect/>
+          </a:stretch>
+        </p:blipFill>
+        <p:spPr>
+          <a:xfrm>
+            <a:off x="4721052" y="1715837"/>
+            <a:ext cx="6185070" cy="4721726"/>
+          </a:xfrm>
+          <a:prstGeom prst="rect">
+            <a:avLst/>
+          </a:prstGeom>
+        </p:spPr>
+      </p:pic>
+      <p:pic>
+        <p:nvPicPr>
+          <p:cNvPr id="4" name="Picture 3"/>
+          <p:cNvPicPr>
+            <a:picLocks noChangeAspect="1"/>
+          </p:cNvPicPr>
+          <p:nvPr/>
+        </p:nvPicPr>
+        <p:blipFill>
+          <a:blip r:embed="rId3">
+            <a:extLst>
+              <a:ext uri="{28A0092B-C50C-407E-A947-70E740481C1C}">
+                <a14:useLocalDpi xmlns:a14="http://schemas.microsoft.com/office/drawing/2010/main" val="0"/>
+              </a:ext>
+            </a:extLst>
+          </a:blip>
+          <a:stretch>
+            <a:fillRect/>
+          </a:stretch>
+        </p:blipFill>
+        <p:spPr>
+          <a:xfrm>
+            <a:off x="1830003" y="2501633"/>
+            <a:ext cx="1435100" cy="2413000"/>
+          </a:xfrm>
+          <a:prstGeom prst="rect">
+            <a:avLst/>
+          </a:prstGeom>
+        </p:spPr>
+      </p:pic>
+      <p:pic>
+        <p:nvPicPr>
+          <p:cNvPr id="6" name="Picture 5"/>
+          <p:cNvPicPr>
+            <a:picLocks noChangeAspect="1"/>
+          </p:cNvPicPr>
+          <p:nvPr/>
+        </p:nvPicPr>
+        <p:blipFill>
+          <a:blip r:embed="rId4">
+            <a:extLst>
+              <a:ext uri="{28A0092B-C50C-407E-A947-70E740481C1C}">
+                <a14:useLocalDpi xmlns:a14="http://schemas.microsoft.com/office/drawing/2010/main" val="0"/>
+              </a:ext>
+            </a:extLst>
+          </a:blip>
+          <a:stretch>
+            <a:fillRect/>
+          </a:stretch>
+        </p:blipFill>
+        <p:spPr>
+          <a:xfrm>
+            <a:off x="1156903" y="5219833"/>
+            <a:ext cx="2781300" cy="977900"/>
+          </a:xfrm>
+          <a:prstGeom prst="rect">
+            <a:avLst/>
+          </a:prstGeom>
+        </p:spPr>
+      </p:pic>
+    </p:spTree>
+    <p:extLst>
+      <p:ext uri="{BB962C8B-B14F-4D97-AF65-F5344CB8AC3E}">
+        <p14:creationId xmlns:p14="http://schemas.microsoft.com/office/powerpoint/2010/main" val="108633756"/>
+      </p:ext>
+    </p:extLst>
+  </p:cSld>
+  <p:clrMapOvr>
+    <a:masterClrMapping/>
+  </p:clrMapOvr>
+</p:sld>
+</file>
+
+<file path=ppt/slides/slide16.xml><?xml version="1.0" encoding="utf-8"?>
+<p:sld xmlns:a="http://schemas.openxmlformats.org/drawingml/2006/main" xmlns:r="http://schemas.openxmlformats.org/officeDocument/2006/relationships" xmlns:p="http://schemas.openxmlformats.org/presentationml/2006/main">
+  <p:cSld>
+    <p:spTree>
+      <p:nvGrpSpPr>
+        <p:cNvPr id="1" name=""/>
+        <p:cNvGrpSpPr/>
+        <p:nvPr/>
+      </p:nvGrpSpPr>
+      <p:grpSpPr>
+        <a:xfrm>
+          <a:off x="0" y="0"/>
+          <a:ext cx="0" cy="0"/>
+          <a:chOff x="0" y="0"/>
+          <a:chExt cx="0" cy="0"/>
+        </a:xfrm>
+      </p:grpSpPr>
+      <p:sp>
+        <p:nvSpPr>
+          <p:cNvPr id="2" name="Title 1"/>
+          <p:cNvSpPr>
+            <a:spLocks noGrp="1"/>
+          </p:cNvSpPr>
+          <p:nvPr>
+            <p:ph type="title"/>
+          </p:nvPr>
+        </p:nvSpPr>
+        <p:spPr/>
+        <p:txBody>
+          <a:bodyPr/>
+          <a:lstStyle/>
+          <a:p>
+            <a:r>
+              <a:rPr lang="en-US" dirty="0" smtClean="0"/>
+              <a:t>Exploratory Factor Analysis (EFA)</a:t>
+            </a:r>
+            <a:endParaRPr lang="en-US" dirty="0"/>
+          </a:p>
+        </p:txBody>
+      </p:sp>
+      <p:sp>
+        <p:nvSpPr>
+          <p:cNvPr id="3" name="Content Placeholder 2"/>
+          <p:cNvSpPr>
+            <a:spLocks noGrp="1"/>
+          </p:cNvSpPr>
+          <p:nvPr>
+            <p:ph idx="1"/>
+          </p:nvPr>
+        </p:nvSpPr>
+        <p:spPr/>
+        <p:txBody>
+          <a:bodyPr>
+            <a:normAutofit/>
+          </a:bodyPr>
+          <a:lstStyle/>
+          <a:p>
+            <a:r>
+              <a:rPr lang="en-US" dirty="0" smtClean="0"/>
+              <a:t>We will use the psych package</a:t>
+            </a:r>
+          </a:p>
+          <a:p>
+            <a:endParaRPr lang="en-US" dirty="0"/>
+          </a:p>
+        </p:txBody>
+      </p:sp>
+      <p:graphicFrame>
+        <p:nvGraphicFramePr>
+          <p:cNvPr id="4" name="Content Placeholder 3"/>
+          <p:cNvGraphicFramePr>
+            <a:graphicFrameLocks/>
+          </p:cNvGraphicFramePr>
+          <p:nvPr>
+            <p:extLst>
+              <p:ext uri="{D42A27DB-BD31-4B8C-83A1-F6EECF244321}">
+                <p14:modId xmlns:p14="http://schemas.microsoft.com/office/powerpoint/2010/main" val="942621839"/>
+              </p:ext>
+            </p:extLst>
+          </p:nvPr>
+        </p:nvGraphicFramePr>
+        <p:xfrm>
+          <a:off x="2058468" y="3185444"/>
+          <a:ext cx="8041934" cy="1782512"/>
+        </p:xfrm>
+        <a:graphic>
+          <a:graphicData uri="http://schemas.openxmlformats.org/drawingml/2006/table">
+            <a:tbl>
+              <a:tblPr firstRow="1" bandRow="1">
+                <a:tableStyleId>{5C22544A-7EE6-4342-B048-85BDC9FD1C3A}</a:tableStyleId>
+              </a:tblPr>
+              <a:tblGrid>
+                <a:gridCol w="4419894"/>
+                <a:gridCol w="3622040"/>
+              </a:tblGrid>
+              <a:tr h="589280">
+                <a:tc>
+                  <a:txBody>
+                    <a:bodyPr/>
+                    <a:lstStyle/>
+                    <a:p>
+                      <a:pPr algn="ctr"/>
+                      <a:r>
+                        <a:rPr lang="en-US" sz="2800" dirty="0" smtClean="0">
+                          <a:solidFill>
+                            <a:schemeClr val="bg1"/>
+                          </a:solidFill>
+                        </a:rPr>
+                        <a:t>Inference Test</a:t>
+                      </a:r>
+                      <a:endParaRPr lang="en-US" sz="2800" dirty="0">
+                        <a:solidFill>
+                          <a:schemeClr val="bg1"/>
+                        </a:solidFill>
+                      </a:endParaRPr>
+                    </a:p>
+                  </a:txBody>
+                  <a:tcPr anchor="b">
+                    <a:lnL w="12700" cmpd="sng">
+                      <a:noFill/>
+                    </a:lnL>
+                    <a:lnR w="12700" cap="flat" cmpd="sng" algn="ctr">
+                      <a:noFill/>
+                      <a:prstDash val="solid"/>
+                      <a:round/>
+                      <a:headEnd type="none" w="med" len="med"/>
+                      <a:tailEnd type="none" w="med" len="med"/>
+                    </a:lnR>
+                    <a:lnT w="38100" cmpd="sng">
+                      <a:noFill/>
+                    </a:lnT>
+                    <a:lnB w="12700" cmpd="sng">
+                      <a:noFill/>
+                    </a:lnB>
+                    <a:lnTlToBr w="12700" cmpd="sng">
+                      <a:noFill/>
+                      <a:prstDash val="solid"/>
+                    </a:lnTlToBr>
+                    <a:lnBlToTr w="12700" cmpd="sng">
+                      <a:noFill/>
+                      <a:prstDash val="solid"/>
+                    </a:lnBlToTr>
+                    <a:solidFill>
+                      <a:schemeClr val="accent1"/>
+                    </a:solidFill>
+                  </a:tcPr>
+                </a:tc>
+                <a:tc>
+                  <a:txBody>
+                    <a:bodyPr/>
+                    <a:lstStyle/>
+                    <a:p>
+                      <a:pPr algn="ctr"/>
+                      <a:r>
+                        <a:rPr lang="en-US" sz="2800" dirty="0" smtClean="0">
+                          <a:solidFill>
+                            <a:schemeClr val="bg1"/>
+                          </a:solidFill>
+                        </a:rPr>
+                        <a:t>R function</a:t>
+                      </a:r>
+                      <a:endParaRPr lang="en-US" sz="2800" dirty="0">
+                        <a:solidFill>
+                          <a:schemeClr val="bg1"/>
+                        </a:solidFill>
+                      </a:endParaRPr>
+                    </a:p>
+                  </a:txBody>
+                  <a:tcPr anchor="b">
+                    <a:lnL w="12700" cmpd="sng">
+                      <a:noFill/>
+                    </a:lnL>
+                    <a:lnR w="12700" cap="flat" cmpd="sng" algn="ctr">
+                      <a:noFill/>
+                      <a:prstDash val="solid"/>
+                      <a:round/>
+                      <a:headEnd type="none" w="med" len="med"/>
+                      <a:tailEnd type="none" w="med" len="med"/>
+                    </a:lnR>
+                    <a:lnT w="38100" cmpd="sng">
+                      <a:noFill/>
+                    </a:lnT>
+                    <a:lnB w="12700" cmpd="sng">
+                      <a:noFill/>
+                    </a:lnB>
+                    <a:lnTlToBr w="12700" cmpd="sng">
+                      <a:noFill/>
+                      <a:prstDash val="solid"/>
+                    </a:lnTlToBr>
+                    <a:lnBlToTr w="12700" cmpd="sng">
+                      <a:noFill/>
+                      <a:prstDash val="solid"/>
+                    </a:lnBlToTr>
+                    <a:solidFill>
+                      <a:schemeClr val="accent1"/>
+                    </a:solidFill>
+                  </a:tcPr>
+                </a:tc>
+              </a:tr>
+              <a:tr h="596616">
+                <a:tc>
+                  <a:txBody>
+                    <a:bodyPr/>
+                    <a:lstStyle/>
+                    <a:p>
+                      <a:pPr algn="ctr"/>
+                      <a:r>
+                        <a:rPr lang="en-US" sz="2400" dirty="0" smtClean="0"/>
+                        <a:t>Factor Analysis</a:t>
+                      </a:r>
+                      <a:endParaRPr lang="en-US" sz="2000" dirty="0"/>
+                    </a:p>
+                  </a:txBody>
+                  <a:tcPr anchor="ctr">
+                    <a:lnL w="12700" cmpd="sng">
+                      <a:noFill/>
+                    </a:lnL>
+                    <a:lnR w="12700" cap="flat" cmpd="sng" algn="ctr">
+                      <a:noFill/>
+                      <a:prstDash val="solid"/>
+                      <a:round/>
+                      <a:headEnd type="none" w="med" len="med"/>
+                      <a:tailEnd type="none" w="med" len="med"/>
+                    </a:lnR>
+                    <a:lnT w="12700" cmpd="sng">
+                      <a:noFill/>
+                    </a:lnT>
+                    <a:lnB w="12700" cmpd="sng">
+                      <a:noFill/>
+                    </a:lnB>
+                    <a:lnTlToBr w="12700" cmpd="sng">
+                      <a:noFill/>
+                      <a:prstDash val="solid"/>
+                    </a:lnTlToBr>
+                    <a:lnBlToTr w="12700" cmpd="sng">
+                      <a:noFill/>
+                      <a:prstDash val="solid"/>
+                    </a:lnBlToTr>
+                  </a:tcPr>
+                </a:tc>
+                <a:tc>
+                  <a:txBody>
+                    <a:bodyPr/>
+                    <a:lstStyle/>
+                    <a:p>
+                      <a:pPr algn="ctr"/>
+                      <a:r>
+                        <a:rPr lang="en-US" sz="2400" dirty="0" smtClean="0"/>
+                        <a:t>fa()</a:t>
+                      </a:r>
+                      <a:endParaRPr lang="en-US" sz="2400" dirty="0"/>
+                    </a:p>
+                  </a:txBody>
+                  <a:tcPr anchor="ctr">
+                    <a:lnL w="12700" cmpd="sng">
+                      <a:noFill/>
+                    </a:lnL>
+                    <a:lnR w="12700" cap="flat" cmpd="sng" algn="ctr">
+                      <a:noFill/>
+                      <a:prstDash val="solid"/>
+                      <a:round/>
+                      <a:headEnd type="none" w="med" len="med"/>
+                      <a:tailEnd type="none" w="med" len="med"/>
+                    </a:lnR>
+                    <a:lnT w="12700" cmpd="sng">
+                      <a:noFill/>
+                    </a:lnT>
+                    <a:lnB w="12700" cmpd="sng">
+                      <a:noFill/>
+                    </a:lnB>
+                    <a:lnTlToBr w="12700" cmpd="sng">
+                      <a:noFill/>
+                      <a:prstDash val="solid"/>
+                    </a:lnTlToBr>
+                    <a:lnBlToTr w="12700" cmpd="sng">
+                      <a:noFill/>
+                      <a:prstDash val="solid"/>
+                    </a:lnBlToTr>
+                  </a:tcPr>
+                </a:tc>
+              </a:tr>
+              <a:tr h="596616">
+                <a:tc>
+                  <a:txBody>
+                    <a:bodyPr/>
+                    <a:lstStyle/>
+                    <a:p>
+                      <a:pPr algn="ctr"/>
+                      <a:r>
+                        <a:rPr lang="en-US" sz="2400" dirty="0" smtClean="0"/>
+                        <a:t>Principal Component Analysis</a:t>
+                      </a:r>
+                      <a:endParaRPr lang="en-US" sz="2400" dirty="0"/>
+                    </a:p>
+                  </a:txBody>
+                  <a:tcPr anchor="ctr">
+                    <a:lnL w="12700" cmpd="sng">
+                      <a:noFill/>
+                    </a:lnL>
+                    <a:lnR w="12700" cap="flat" cmpd="sng" algn="ctr">
+                      <a:noFill/>
+                      <a:prstDash val="solid"/>
+                      <a:round/>
+                      <a:headEnd type="none" w="med" len="med"/>
+                      <a:tailEnd type="none" w="med" len="med"/>
+                    </a:lnR>
+                    <a:lnT w="12700" cmpd="sng">
+                      <a:noFill/>
+                    </a:lnT>
+                    <a:lnB w="12700" cmpd="sng">
+                      <a:noFill/>
+                    </a:lnB>
+                    <a:lnTlToBr w="12700" cmpd="sng">
+                      <a:noFill/>
+                      <a:prstDash val="solid"/>
+                    </a:lnTlToBr>
+                    <a:lnBlToTr w="12700" cmpd="sng">
+                      <a:noFill/>
+                      <a:prstDash val="solid"/>
+                    </a:lnBlToTr>
+                  </a:tcPr>
+                </a:tc>
+                <a:tc>
+                  <a:txBody>
+                    <a:bodyPr/>
+                    <a:lstStyle/>
+                    <a:p>
+                      <a:pPr algn="ctr"/>
+                      <a:r>
+                        <a:rPr lang="en-US" sz="2400" dirty="0" smtClean="0"/>
+                        <a:t>principal()</a:t>
+                      </a:r>
+                      <a:endParaRPr lang="en-US" sz="2400" dirty="0"/>
+                    </a:p>
+                  </a:txBody>
+                  <a:tcPr anchor="ctr">
+                    <a:lnL w="12700" cmpd="sng">
+                      <a:noFill/>
+                    </a:lnL>
+                    <a:lnR w="12700" cap="flat" cmpd="sng" algn="ctr">
+                      <a:noFill/>
+                      <a:prstDash val="solid"/>
+                      <a:round/>
+                      <a:headEnd type="none" w="med" len="med"/>
+                      <a:tailEnd type="none" w="med" len="med"/>
+                    </a:lnR>
+                    <a:lnT w="12700" cmpd="sng">
+                      <a:noFill/>
+                    </a:lnT>
+                    <a:lnB w="12700" cmpd="sng">
+                      <a:noFill/>
+                    </a:lnB>
+                    <a:lnTlToBr w="12700" cmpd="sng">
+                      <a:noFill/>
+                      <a:prstDash val="solid"/>
+                    </a:lnTlToBr>
+                    <a:lnBlToTr w="12700" cmpd="sng">
+                      <a:noFill/>
+                      <a:prstDash val="solid"/>
+                    </a:lnBlToTr>
+                  </a:tcPr>
+                </a:tc>
+              </a:tr>
+            </a:tbl>
+          </a:graphicData>
+        </a:graphic>
+      </p:graphicFrame>
+    </p:spTree>
+    <p:extLst>
+      <p:ext uri="{BB962C8B-B14F-4D97-AF65-F5344CB8AC3E}">
+        <p14:creationId xmlns:p14="http://schemas.microsoft.com/office/powerpoint/2010/main" val="510485892"/>
+      </p:ext>
+    </p:extLst>
+  </p:cSld>
+  <p:clrMapOvr>
+    <a:masterClrMapping/>
+  </p:clrMapOvr>
+</p:sld>
+</file>
+
+<file path=ppt/slides/slide17.xml><?xml version="1.0" encoding="utf-8"?>
+<p:sld xmlns:a="http://schemas.openxmlformats.org/drawingml/2006/main" xmlns:r="http://schemas.openxmlformats.org/officeDocument/2006/relationships" xmlns:p="http://schemas.openxmlformats.org/presentationml/2006/main">
+  <p:cSld>
+    <p:spTree>
+      <p:nvGrpSpPr>
+        <p:cNvPr id="1" name=""/>
+        <p:cNvGrpSpPr/>
+        <p:nvPr/>
+      </p:nvGrpSpPr>
+      <p:grpSpPr>
+        <a:xfrm>
+          <a:off x="0" y="0"/>
+          <a:ext cx="0" cy="0"/>
+          <a:chOff x="0" y="0"/>
+          <a:chExt cx="0" cy="0"/>
+        </a:xfrm>
+      </p:grpSpPr>
+      <p:sp>
+        <p:nvSpPr>
+          <p:cNvPr id="2" name="Title 1"/>
+          <p:cNvSpPr>
+            <a:spLocks noGrp="1"/>
+          </p:cNvSpPr>
+          <p:nvPr>
+            <p:ph type="title"/>
+          </p:nvPr>
+        </p:nvSpPr>
+        <p:spPr/>
+        <p:txBody>
+          <a:bodyPr/>
+          <a:lstStyle/>
+          <a:p>
+            <a:pPr>
+              <a:lnSpc>
+                <a:spcPct val="120000"/>
+              </a:lnSpc>
+              <a:spcBef>
+                <a:spcPts val="0"/>
+              </a:spcBef>
+            </a:pPr>
+            <a:r>
+              <a:rPr lang="en-US" dirty="0" smtClean="0"/>
+              <a:t>R Markdown file</a:t>
+            </a:r>
+            <a:endParaRPr lang="en-US" dirty="0"/>
+          </a:p>
+        </p:txBody>
+      </p:sp>
+      <p:sp>
+        <p:nvSpPr>
+          <p:cNvPr id="4" name="Text Placeholder 3"/>
+          <p:cNvSpPr>
+            <a:spLocks noGrp="1"/>
+          </p:cNvSpPr>
+          <p:nvPr>
+            <p:ph type="body" idx="1"/>
+          </p:nvPr>
+        </p:nvSpPr>
+        <p:spPr/>
+        <p:txBody>
+          <a:bodyPr/>
+          <a:lstStyle/>
+          <a:p>
+            <a:endParaRPr lang="en-US"/>
+          </a:p>
+        </p:txBody>
+      </p:sp>
+    </p:spTree>
+    <p:extLst>
+      <p:ext uri="{BB962C8B-B14F-4D97-AF65-F5344CB8AC3E}">
+        <p14:creationId xmlns:p14="http://schemas.microsoft.com/office/powerpoint/2010/main" val="658384154"/>
+      </p:ext>
+    </p:extLst>
+  </p:cSld>
+  <p:clrMapOvr>
+    <a:masterClrMapping/>
+  </p:clrMapOvr>
+</p:sld>
+</file>
+
+<file path=ppt/slides/slide18.xml><?xml version="1.0" encoding="utf-8"?>
+<p:sld xmlns:a="http://schemas.openxmlformats.org/drawingml/2006/main" xmlns:r="http://schemas.openxmlformats.org/officeDocument/2006/relationships" xmlns:p="http://schemas.openxmlformats.org/presentationml/2006/main">
+  <p:cSld>
+    <p:spTree>
+      <p:nvGrpSpPr>
+        <p:cNvPr id="1" name=""/>
+        <p:cNvGrpSpPr/>
+        <p:nvPr/>
+      </p:nvGrpSpPr>
+      <p:grpSpPr>
+        <a:xfrm>
+          <a:off x="0" y="0"/>
+          <a:ext cx="0" cy="0"/>
+          <a:chOff x="0" y="0"/>
+          <a:chExt cx="0" cy="0"/>
+        </a:xfrm>
+      </p:grpSpPr>
+      <p:sp>
+        <p:nvSpPr>
+          <p:cNvPr id="2" name="Title 1"/>
+          <p:cNvSpPr>
+            <a:spLocks noGrp="1"/>
+          </p:cNvSpPr>
+          <p:nvPr>
+            <p:ph type="title"/>
+          </p:nvPr>
+        </p:nvSpPr>
+        <p:spPr/>
+        <p:txBody>
+          <a:bodyPr/>
+          <a:lstStyle/>
+          <a:p>
+            <a:r>
+              <a:rPr lang="en-US" dirty="0" smtClean="0"/>
               <a:t>Confirmatory Factor Analysis (CFA)</a:t>
             </a:r>
             <a:endParaRPr lang="en-US" dirty="0"/>
@@ -4325,7 +5829,7 @@
 </p:sld>
 </file>
 
-<file path=ppt/slides/slide11.xml><?xml version="1.0" encoding="utf-8"?>
+<file path=ppt/slides/slide19.xml><?xml version="1.0" encoding="utf-8"?>
 <p:sld xmlns:a="http://schemas.openxmlformats.org/drawingml/2006/main" xmlns:r="http://schemas.openxmlformats.org/officeDocument/2006/relationships" xmlns:p="http://schemas.openxmlformats.org/presentationml/2006/main">
   <p:cSld>
     <p:spTree>
@@ -4592,7 +6096,7 @@
 </p:sld>
 </file>
 
-<file path=ppt/slides/slide12.xml><?xml version="1.0" encoding="utf-8"?>
+<file path=ppt/slides/slide2.xml><?xml version="1.0" encoding="utf-8"?>
 <p:sld xmlns:a="http://schemas.openxmlformats.org/drawingml/2006/main" xmlns:r="http://schemas.openxmlformats.org/officeDocument/2006/relationships" xmlns:p="http://schemas.openxmlformats.org/presentationml/2006/main">
   <p:cSld>
     <p:spTree>
@@ -4611,6 +6115,148 @@
       </p:grpSpPr>
       <p:sp>
         <p:nvSpPr>
+          <p:cNvPr id="4" name="Title 3"/>
+          <p:cNvSpPr>
+            <a:spLocks noGrp="1"/>
+          </p:cNvSpPr>
+          <p:nvPr>
+            <p:ph type="title"/>
+          </p:nvPr>
+        </p:nvSpPr>
+        <p:spPr/>
+        <p:txBody>
+          <a:bodyPr/>
+          <a:lstStyle/>
+          <a:p>
+            <a:r>
+              <a:rPr lang="en-US" dirty="0" smtClean="0"/>
+              <a:t>Day 2</a:t>
+            </a:r>
+            <a:endParaRPr lang="en-US" dirty="0"/>
+          </a:p>
+        </p:txBody>
+      </p:sp>
+      <p:sp>
+        <p:nvSpPr>
+          <p:cNvPr id="5" name="Text Placeholder 4"/>
+          <p:cNvSpPr>
+            <a:spLocks noGrp="1"/>
+          </p:cNvSpPr>
+          <p:nvPr>
+            <p:ph type="body" idx="1"/>
+          </p:nvPr>
+        </p:nvSpPr>
+        <p:spPr/>
+        <p:txBody>
+          <a:bodyPr>
+            <a:normAutofit fontScale="92500" lnSpcReduction="20000"/>
+          </a:bodyPr>
+          <a:lstStyle/>
+          <a:p>
+            <a:pPr marL="342900" indent="-342900" algn="l">
+              <a:lnSpc>
+                <a:spcPct val="120000"/>
+              </a:lnSpc>
+              <a:spcBef>
+                <a:spcPts val="0"/>
+              </a:spcBef>
+              <a:buFont typeface="Arial" panose="020B0604020202020204" pitchFamily="34" charset="0"/>
+              <a:buChar char="•"/>
+            </a:pPr>
+            <a:r>
+              <a:rPr lang="en-US" dirty="0" smtClean="0"/>
+              <a:t>ANOVA and regression</a:t>
+            </a:r>
+          </a:p>
+          <a:p>
+            <a:pPr marL="342900" indent="-342900" algn="l">
+              <a:lnSpc>
+                <a:spcPct val="120000"/>
+              </a:lnSpc>
+              <a:spcBef>
+                <a:spcPts val="0"/>
+              </a:spcBef>
+              <a:buFont typeface="Arial" panose="020B0604020202020204" pitchFamily="34" charset="0"/>
+              <a:buChar char="•"/>
+            </a:pPr>
+            <a:r>
+              <a:rPr lang="en-US" dirty="0" smtClean="0"/>
+              <a:t>Preparing APA style manuscripts</a:t>
+            </a:r>
+          </a:p>
+          <a:p>
+            <a:pPr marL="342900" indent="-342900" algn="l">
+              <a:lnSpc>
+                <a:spcPct val="120000"/>
+              </a:lnSpc>
+              <a:spcBef>
+                <a:spcPts val="0"/>
+              </a:spcBef>
+              <a:buFont typeface="Arial" panose="020B0604020202020204" pitchFamily="34" charset="0"/>
+              <a:buChar char="•"/>
+            </a:pPr>
+            <a:r>
+              <a:rPr lang="en-US" dirty="0" smtClean="0"/>
+              <a:t>Exploratory Factor Analysis (EFA) and Confirmatory Factor Analysis (CFA)</a:t>
+            </a:r>
+          </a:p>
+          <a:p>
+            <a:pPr marL="342900" indent="-342900" algn="l">
+              <a:lnSpc>
+                <a:spcPct val="120000"/>
+              </a:lnSpc>
+              <a:spcBef>
+                <a:spcPts val="0"/>
+              </a:spcBef>
+              <a:buFont typeface="Arial" panose="020B0604020202020204" pitchFamily="34" charset="0"/>
+              <a:buChar char="•"/>
+            </a:pPr>
+            <a:r>
+              <a:rPr lang="en-US" dirty="0" smtClean="0"/>
+              <a:t>Path Analysis and SEM</a:t>
+            </a:r>
+          </a:p>
+        </p:txBody>
+      </p:sp>
+    </p:spTree>
+    <p:extLst>
+      <p:ext uri="{BB962C8B-B14F-4D97-AF65-F5344CB8AC3E}">
+        <p14:creationId xmlns:p14="http://schemas.microsoft.com/office/powerpoint/2010/main" val="2138594110"/>
+      </p:ext>
+    </p:extLst>
+  </p:cSld>
+  <p:clrMapOvr>
+    <a:masterClrMapping/>
+  </p:clrMapOvr>
+  <p:timing>
+    <p:tnLst>
+      <p:par>
+        <p:cTn id="1" dur="indefinite" restart="never" nodeType="tmRoot"/>
+      </p:par>
+    </p:tnLst>
+  </p:timing>
+</p:sld>
+</file>
+
+<file path=ppt/slides/slide20.xml><?xml version="1.0" encoding="utf-8"?>
+<p:sld xmlns:a="http://schemas.openxmlformats.org/drawingml/2006/main" xmlns:r="http://schemas.openxmlformats.org/officeDocument/2006/relationships" xmlns:p="http://schemas.openxmlformats.org/presentationml/2006/main">
+  <p:cSld>
+    <p:spTree>
+      <p:nvGrpSpPr>
+        <p:cNvPr id="1" name=""/>
+        <p:cNvGrpSpPr/>
+        <p:nvPr/>
+      </p:nvGrpSpPr>
+      <p:grpSpPr>
+        <a:xfrm>
+          <a:off x="0" y="0"/>
+          <a:ext cx="0" cy="0"/>
+          <a:chOff x="0" y="0"/>
+          <a:chExt cx="0" cy="0"/>
+        </a:xfrm>
+      </p:grpSpPr>
+      <p:sp>
+        <p:nvSpPr>
           <p:cNvPr id="2" name="Title 1"/>
           <p:cNvSpPr>
             <a:spLocks noGrp="1"/>
@@ -4760,7 +6406,7 @@
 </p:sld>
 </file>
 
-<file path=ppt/slides/slide13.xml><?xml version="1.0" encoding="utf-8"?>
+<file path=ppt/slides/slide21.xml><?xml version="1.0" encoding="utf-8"?>
 <p:sld xmlns:a="http://schemas.openxmlformats.org/drawingml/2006/main" xmlns:r="http://schemas.openxmlformats.org/officeDocument/2006/relationships" xmlns:p="http://schemas.openxmlformats.org/presentationml/2006/main">
   <p:cSld>
     <p:spTree>
@@ -4880,7 +6526,7 @@
 </p:sld>
 </file>
 
-<file path=ppt/slides/slide14.xml><?xml version="1.0" encoding="utf-8"?>
+<file path=ppt/slides/slide22.xml><?xml version="1.0" encoding="utf-8"?>
 <p:sld xmlns:a="http://schemas.openxmlformats.org/drawingml/2006/main" xmlns:r="http://schemas.openxmlformats.org/officeDocument/2006/relationships" xmlns:p="http://schemas.openxmlformats.org/presentationml/2006/main">
   <p:cSld>
     <p:spTree>
@@ -5000,7 +6646,7 @@
 </p:sld>
 </file>
 
-<file path=ppt/slides/slide15.xml><?xml version="1.0" encoding="utf-8"?>
+<file path=ppt/slides/slide23.xml><?xml version="1.0" encoding="utf-8"?>
 <p:sld xmlns:a="http://schemas.openxmlformats.org/drawingml/2006/main" xmlns:r="http://schemas.openxmlformats.org/officeDocument/2006/relationships" xmlns:p="http://schemas.openxmlformats.org/presentationml/2006/main">
   <p:cSld>
     <p:spTree>
@@ -5228,7 +6874,7 @@
 </p:sld>
 </file>
 
-<file path=ppt/slides/slide16.xml><?xml version="1.0" encoding="utf-8"?>
+<file path=ppt/slides/slide24.xml><?xml version="1.0" encoding="utf-8"?>
 <p:sld xmlns:a="http://schemas.openxmlformats.org/drawingml/2006/main" xmlns:r="http://schemas.openxmlformats.org/officeDocument/2006/relationships" xmlns:p="http://schemas.openxmlformats.org/presentationml/2006/main">
   <p:cSld>
     <p:spTree>
@@ -5300,7 +6946,7 @@
 </p:sld>
 </file>
 
-<file path=ppt/slides/slide17.xml><?xml version="1.0" encoding="utf-8"?>
+<file path=ppt/slides/slide25.xml><?xml version="1.0" encoding="utf-8"?>
 <p:sld xmlns:a="http://schemas.openxmlformats.org/drawingml/2006/main" xmlns:r="http://schemas.openxmlformats.org/officeDocument/2006/relationships" xmlns:p="http://schemas.openxmlformats.org/presentationml/2006/main">
   <p:cSld>
     <p:spTree>
@@ -5377,148 +7023,6 @@
   <p:clrMapOvr>
     <a:masterClrMapping/>
   </p:clrMapOvr>
-</p:sld>
-</file>
-
-<file path=ppt/slides/slide2.xml><?xml version="1.0" encoding="utf-8"?>
-<p:sld xmlns:a="http://schemas.openxmlformats.org/drawingml/2006/main" xmlns:r="http://schemas.openxmlformats.org/officeDocument/2006/relationships" xmlns:p="http://schemas.openxmlformats.org/presentationml/2006/main">
-  <p:cSld>
-    <p:spTree>
-      <p:nvGrpSpPr>
-        <p:cNvPr id="1" name=""/>
-        <p:cNvGrpSpPr/>
-        <p:nvPr/>
-      </p:nvGrpSpPr>
-      <p:grpSpPr>
-        <a:xfrm>
-          <a:off x="0" y="0"/>
-          <a:ext cx="0" cy="0"/>
-          <a:chOff x="0" y="0"/>
-          <a:chExt cx="0" cy="0"/>
-        </a:xfrm>
-      </p:grpSpPr>
-      <p:sp>
-        <p:nvSpPr>
-          <p:cNvPr id="4" name="Title 3"/>
-          <p:cNvSpPr>
-            <a:spLocks noGrp="1"/>
-          </p:cNvSpPr>
-          <p:nvPr>
-            <p:ph type="title"/>
-          </p:nvPr>
-        </p:nvSpPr>
-        <p:spPr/>
-        <p:txBody>
-          <a:bodyPr/>
-          <a:lstStyle/>
-          <a:p>
-            <a:r>
-              <a:rPr lang="en-US" dirty="0" smtClean="0"/>
-              <a:t>Day 2</a:t>
-            </a:r>
-            <a:endParaRPr lang="en-US" dirty="0"/>
-          </a:p>
-        </p:txBody>
-      </p:sp>
-      <p:sp>
-        <p:nvSpPr>
-          <p:cNvPr id="5" name="Text Placeholder 4"/>
-          <p:cNvSpPr>
-            <a:spLocks noGrp="1"/>
-          </p:cNvSpPr>
-          <p:nvPr>
-            <p:ph type="body" idx="1"/>
-          </p:nvPr>
-        </p:nvSpPr>
-        <p:spPr/>
-        <p:txBody>
-          <a:bodyPr>
-            <a:normAutofit fontScale="92500" lnSpcReduction="20000"/>
-          </a:bodyPr>
-          <a:lstStyle/>
-          <a:p>
-            <a:pPr marL="342900" indent="-342900" algn="l">
-              <a:lnSpc>
-                <a:spcPct val="120000"/>
-              </a:lnSpc>
-              <a:spcBef>
-                <a:spcPts val="0"/>
-              </a:spcBef>
-              <a:buFont typeface="Arial" panose="020B0604020202020204" pitchFamily="34" charset="0"/>
-              <a:buChar char="•"/>
-            </a:pPr>
-            <a:r>
-              <a:rPr lang="en-US" dirty="0" smtClean="0"/>
-              <a:t>ANOVA and regression</a:t>
-            </a:r>
-          </a:p>
-          <a:p>
-            <a:pPr marL="342900" indent="-342900" algn="l">
-              <a:lnSpc>
-                <a:spcPct val="120000"/>
-              </a:lnSpc>
-              <a:spcBef>
-                <a:spcPts val="0"/>
-              </a:spcBef>
-              <a:buFont typeface="Arial" panose="020B0604020202020204" pitchFamily="34" charset="0"/>
-              <a:buChar char="•"/>
-            </a:pPr>
-            <a:r>
-              <a:rPr lang="en-US" dirty="0" smtClean="0"/>
-              <a:t>Preparing APA style manuscripts</a:t>
-            </a:r>
-          </a:p>
-          <a:p>
-            <a:pPr marL="342900" indent="-342900" algn="l">
-              <a:lnSpc>
-                <a:spcPct val="120000"/>
-              </a:lnSpc>
-              <a:spcBef>
-                <a:spcPts val="0"/>
-              </a:spcBef>
-              <a:buFont typeface="Arial" panose="020B0604020202020204" pitchFamily="34" charset="0"/>
-              <a:buChar char="•"/>
-            </a:pPr>
-            <a:r>
-              <a:rPr lang="en-US" dirty="0" smtClean="0"/>
-              <a:t>Exploratory Factor Analysis (EFA) and Confirmatory Factor Analysis (CFA)</a:t>
-            </a:r>
-          </a:p>
-          <a:p>
-            <a:pPr marL="342900" indent="-342900" algn="l">
-              <a:lnSpc>
-                <a:spcPct val="120000"/>
-              </a:lnSpc>
-              <a:spcBef>
-                <a:spcPts val="0"/>
-              </a:spcBef>
-              <a:buFont typeface="Arial" panose="020B0604020202020204" pitchFamily="34" charset="0"/>
-              <a:buChar char="•"/>
-            </a:pPr>
-            <a:r>
-              <a:rPr lang="en-US" dirty="0" smtClean="0"/>
-              <a:t>Path Analysis and SEM</a:t>
-            </a:r>
-          </a:p>
-        </p:txBody>
-      </p:sp>
-    </p:spTree>
-    <p:extLst>
-      <p:ext uri="{BB962C8B-B14F-4D97-AF65-F5344CB8AC3E}">
-        <p14:creationId xmlns:p14="http://schemas.microsoft.com/office/powerpoint/2010/main" val="2138594110"/>
-      </p:ext>
-    </p:extLst>
-  </p:cSld>
-  <p:clrMapOvr>
-    <a:masterClrMapping/>
-  </p:clrMapOvr>
-  <p:timing>
-    <p:tnLst>
-      <p:par>
-        <p:cTn id="1" dur="indefinite" restart="never" nodeType="tmRoot"/>
-      </p:par>
-    </p:tnLst>
-  </p:timing>
 </p:sld>
 </file>
 
@@ -7613,10 +9117,65 @@
         </p:nvSpPr>
         <p:spPr/>
         <p:txBody>
-          <a:bodyPr/>
+          <a:bodyPr>
+            <a:normAutofit/>
+          </a:bodyPr>
           <a:lstStyle/>
           <a:p>
-            <a:endParaRPr lang="en-US"/>
+            <a:r>
+              <a:rPr lang="en-US" dirty="0" smtClean="0"/>
+              <a:t>Often we want to be able to describe a relatively large number of </a:t>
+            </a:r>
+            <a:r>
+              <a:rPr lang="en-US" b="1" dirty="0" smtClean="0"/>
+              <a:t>items</a:t>
+            </a:r>
+            <a:r>
+              <a:rPr lang="en-US" dirty="0" smtClean="0"/>
+              <a:t> by a much fewer number of </a:t>
+            </a:r>
+            <a:r>
+              <a:rPr lang="en-US" b="1" dirty="0" smtClean="0"/>
+              <a:t>factors</a:t>
+            </a:r>
+            <a:r>
+              <a:rPr lang="en-US" dirty="0" smtClean="0"/>
+              <a:t>. </a:t>
+            </a:r>
+          </a:p>
+          <a:p>
+            <a:endParaRPr lang="en-US" dirty="0"/>
+          </a:p>
+          <a:p>
+            <a:r>
+              <a:rPr lang="en-US" dirty="0" smtClean="0"/>
+              <a:t>In the </a:t>
+            </a:r>
+            <a:r>
+              <a:rPr lang="en-US" dirty="0" err="1" smtClean="0"/>
+              <a:t>bfi</a:t>
+            </a:r>
+            <a:r>
+              <a:rPr lang="en-US" dirty="0" smtClean="0"/>
+              <a:t> dataset there are 25 items measuring personality, but are there just a few underlying factors that are responsible for people’s scores on those items?</a:t>
+            </a:r>
+          </a:p>
+          <a:p>
+            <a:endParaRPr lang="en-US" dirty="0"/>
+          </a:p>
+          <a:p>
+            <a:r>
+              <a:rPr lang="en-US" dirty="0" smtClean="0"/>
+              <a:t>We might guess what those are (e.g., extroversion, conscientiousness, etc.), but if we didn’t know we could use </a:t>
+            </a:r>
+            <a:r>
+              <a:rPr lang="en-US" b="1" dirty="0" smtClean="0"/>
+              <a:t>EFA</a:t>
+            </a:r>
+            <a:r>
+              <a:rPr lang="en-US" dirty="0" smtClean="0"/>
+              <a:t> to let the data tell us about the underlying dimensions.</a:t>
+            </a:r>
           </a:p>
         </p:txBody>
       </p:sp>

</xml_diff>